<commit_message>
changed next steps image
</commit_message>
<xml_diff>
--- a/Logger.pptx
+++ b/Logger.pptx
@@ -4469,18 +4469,139 @@
           </a:p>
         </p:txBody>
       </p:sp>
+      <p:sp>
+        <p:nvSpPr>
+          <p:cNvPr id="5" name="TextBox 4"/>
+          <p:cNvSpPr txBox="1"/>
+          <p:nvPr/>
+        </p:nvSpPr>
+        <p:spPr>
+          <a:xfrm>
+            <a:off x="940125" y="2465973"/>
+            <a:ext cx="7035800" cy="3662541"/>
+          </a:xfrm>
+          <a:prstGeom prst="rect">
+            <a:avLst/>
+          </a:prstGeom>
+          <a:noFill/>
+        </p:spPr>
+        <p:txBody>
+          <a:bodyPr wrap="square" rtlCol="0">
+            <a:spAutoFit/>
+          </a:bodyPr>
+          <a:lstStyle/>
+          <a:p>
+            <a:pPr marL="285750" indent="-285750">
+              <a:buFont typeface="Arial" panose="020B0604020202020204" pitchFamily="34" charset="0"/>
+              <a:buChar char="•"/>
+            </a:pPr>
+            <a:r>
+              <a:rPr lang="en-US" sz="2800" dirty="0" smtClean="0"/>
+              <a:t>Saving the logs directly on the server</a:t>
+            </a:r>
+          </a:p>
+          <a:p>
+            <a:pPr marL="285750" indent="-285750">
+              <a:buFont typeface="Arial" panose="020B0604020202020204" pitchFamily="34" charset="0"/>
+              <a:buChar char="•"/>
+            </a:pPr>
+            <a:r>
+              <a:rPr lang="en-US" sz="2800" dirty="0" smtClean="0"/>
+              <a:t>Set maximum number of recorded events</a:t>
+            </a:r>
+          </a:p>
+          <a:p>
+            <a:pPr marL="285750" indent="-285750">
+              <a:buFont typeface="Arial" panose="020B0604020202020204" pitchFamily="34" charset="0"/>
+              <a:buChar char="•"/>
+            </a:pPr>
+            <a:r>
+              <a:rPr lang="en-US" sz="2800" dirty="0" smtClean="0"/>
+              <a:t>Customize the generated file name</a:t>
+            </a:r>
+          </a:p>
+          <a:p>
+            <a:pPr marL="285750" indent="-285750">
+              <a:buFont typeface="Arial" panose="020B0604020202020204" pitchFamily="34" charset="0"/>
+              <a:buChar char="•"/>
+            </a:pPr>
+            <a:r>
+              <a:rPr lang="en-US" sz="2800" dirty="0" smtClean="0"/>
+              <a:t>Add </a:t>
+            </a:r>
+            <a:r>
+              <a:rPr lang="en-US" sz="2800" dirty="0" err="1" smtClean="0"/>
+              <a:t>stacktrace</a:t>
+            </a:r>
+            <a:endParaRPr lang="en-US" sz="2800" dirty="0" smtClean="0"/>
+          </a:p>
+          <a:p>
+            <a:pPr marL="285750" indent="-285750">
+              <a:buFont typeface="Arial" panose="020B0604020202020204" pitchFamily="34" charset="0"/>
+              <a:buChar char="•"/>
+            </a:pPr>
+            <a:r>
+              <a:rPr lang="en-US" sz="2800" dirty="0" smtClean="0"/>
+              <a:t>Use </a:t>
+            </a:r>
+            <a:r>
+              <a:rPr lang="en-US" sz="2800" dirty="0" err="1" smtClean="0"/>
+              <a:t>websockets</a:t>
+            </a:r>
+            <a:r>
+              <a:rPr lang="en-US" sz="2800" dirty="0" smtClean="0"/>
+              <a:t> to “supervise” </a:t>
+            </a:r>
+            <a:r>
+              <a:rPr lang="en-US" sz="2800" dirty="0" smtClean="0">
+                <a:sym typeface="Wingdings" panose="05000000000000000000" pitchFamily="2" charset="2"/>
+              </a:rPr>
+              <a:t></a:t>
+            </a:r>
+            <a:r>
+              <a:rPr lang="en-US" sz="2800" dirty="0" smtClean="0"/>
+              <a:t> your clients</a:t>
+            </a:r>
+          </a:p>
+          <a:p>
+            <a:pPr marL="285750" indent="-285750">
+              <a:buFont typeface="Arial" panose="020B0604020202020204" pitchFamily="34" charset="0"/>
+              <a:buChar char="•"/>
+            </a:pPr>
+            <a:r>
+              <a:rPr lang="en-US" sz="2800" dirty="0" smtClean="0"/>
+              <a:t>Feel free to contribute on </a:t>
+            </a:r>
+            <a:r>
+              <a:rPr lang="en-US" sz="2800" dirty="0" smtClean="0">
+                <a:hlinkClick r:id="rId2"/>
+              </a:rPr>
+              <a:t>https://github.com/bogdan-cornianu/logger</a:t>
+            </a:r>
+            <a:endParaRPr lang="en-US" sz="2800" dirty="0" smtClean="0"/>
+          </a:p>
+          <a:p>
+            <a:pPr marL="285750" indent="-285750">
+              <a:buFont typeface="Arial" panose="020B0604020202020204" pitchFamily="34" charset="0"/>
+              <a:buChar char="•"/>
+            </a:pPr>
+            <a:endParaRPr lang="en-US" dirty="0" smtClean="0"/>
+          </a:p>
+          <a:p>
+            <a:endParaRPr lang="en-US" dirty="0"/>
+          </a:p>
+        </p:txBody>
+      </p:sp>
       <p:pic>
         <p:nvPicPr>
-          <p:cNvPr id="4" name="Content Placeholder 3"/>
+          <p:cNvPr id="6" name="Picture 5"/>
           <p:cNvPicPr>
-            <a:picLocks noGrp="1" noChangeAspect="1"/>
+            <a:picLocks noChangeAspect="1"/>
           </p:cNvPicPr>
-          <p:nvPr>
-            <p:ph idx="1"/>
-          </p:nvPr>
+          <p:nvPr/>
         </p:nvPicPr>
         <p:blipFill>
-          <a:blip r:embed="rId2">
+          <a:blip r:embed="rId3">
             <a:extLst>
               <a:ext uri="{28A0092B-C50C-407E-A947-70E740481C1C}">
                 <a14:useLocalDpi xmlns:a14="http://schemas.microsoft.com/office/drawing/2010/main" val="0"/>
@@ -4493,114 +4614,30 @@
         </p:blipFill>
         <p:spPr>
           <a:xfrm>
-            <a:off x="8077850" y="1690688"/>
-            <a:ext cx="3275950" cy="4351338"/>
-          </a:xfrm>
-        </p:spPr>
-      </p:pic>
-      <p:sp>
-        <p:nvSpPr>
-          <p:cNvPr id="5" name="TextBox 4"/>
-          <p:cNvSpPr txBox="1"/>
-          <p:nvPr/>
-        </p:nvSpPr>
-        <p:spPr>
-          <a:xfrm>
-            <a:off x="940125" y="2465973"/>
-            <a:ext cx="7035800" cy="2800767"/>
+            <a:off x="8145625" y="1690688"/>
+            <a:ext cx="3208175" cy="4437826"/>
           </a:xfrm>
           <a:prstGeom prst="rect">
             <a:avLst/>
           </a:prstGeom>
-          <a:noFill/>
         </p:spPr>
-        <p:txBody>
-          <a:bodyPr wrap="square" rtlCol="0">
-            <a:spAutoFit/>
-          </a:bodyPr>
-          <a:lstStyle/>
-          <a:p>
-            <a:pPr marL="285750" indent="-285750">
-              <a:buFont typeface="Arial" panose="020B0604020202020204" pitchFamily="34" charset="0"/>
-              <a:buChar char="•"/>
-            </a:pPr>
-            <a:r>
-              <a:rPr lang="en-US" sz="2800" dirty="0" smtClean="0"/>
-              <a:t>Saving the logs directly on the server</a:t>
-            </a:r>
-          </a:p>
-          <a:p>
-            <a:pPr marL="285750" indent="-285750">
-              <a:buFont typeface="Arial" panose="020B0604020202020204" pitchFamily="34" charset="0"/>
-              <a:buChar char="•"/>
-            </a:pPr>
-            <a:r>
-              <a:rPr lang="en-US" sz="2800" dirty="0" smtClean="0"/>
-              <a:t>Set maximum number of recorded events</a:t>
-            </a:r>
-          </a:p>
-          <a:p>
-            <a:pPr marL="285750" indent="-285750">
-              <a:buFont typeface="Arial" panose="020B0604020202020204" pitchFamily="34" charset="0"/>
-              <a:buChar char="•"/>
-            </a:pPr>
-            <a:r>
-              <a:rPr lang="en-US" sz="2800" dirty="0" smtClean="0"/>
-              <a:t>Customize the generated file name</a:t>
-            </a:r>
-          </a:p>
-          <a:p>
-            <a:pPr marL="285750" indent="-285750">
-              <a:buFont typeface="Arial" panose="020B0604020202020204" pitchFamily="34" charset="0"/>
-              <a:buChar char="•"/>
-            </a:pPr>
-            <a:r>
-              <a:rPr lang="en-US" sz="2800" dirty="0" smtClean="0"/>
-              <a:t>Add </a:t>
-            </a:r>
-            <a:r>
-              <a:rPr lang="en-US" sz="2800" dirty="0" err="1" smtClean="0"/>
-              <a:t>stacktrace</a:t>
-            </a:r>
-            <a:endParaRPr lang="en-US" sz="2800" dirty="0" smtClean="0"/>
-          </a:p>
-          <a:p>
-            <a:pPr marL="285750" indent="-285750">
-              <a:buFont typeface="Arial" panose="020B0604020202020204" pitchFamily="34" charset="0"/>
-              <a:buChar char="•"/>
-            </a:pPr>
-            <a:r>
-              <a:rPr lang="en-US" sz="2800" dirty="0" smtClean="0"/>
-              <a:t>Use </a:t>
-            </a:r>
-            <a:r>
-              <a:rPr lang="en-US" sz="2800" dirty="0" err="1" smtClean="0"/>
-              <a:t>websockets</a:t>
-            </a:r>
-            <a:r>
-              <a:rPr lang="en-US" sz="2800" dirty="0" smtClean="0"/>
-              <a:t> to “supervise” </a:t>
-            </a:r>
-            <a:r>
-              <a:rPr lang="en-US" sz="2800" dirty="0" smtClean="0">
-                <a:sym typeface="Wingdings" panose="05000000000000000000" pitchFamily="2" charset="2"/>
-              </a:rPr>
-              <a:t></a:t>
-            </a:r>
-            <a:r>
-              <a:rPr lang="en-US" sz="2800" dirty="0" smtClean="0"/>
-              <a:t> your clients</a:t>
-            </a:r>
-          </a:p>
-          <a:p>
-            <a:pPr marL="285750" indent="-285750">
-              <a:buFont typeface="Arial" panose="020B0604020202020204" pitchFamily="34" charset="0"/>
-              <a:buChar char="•"/>
-            </a:pPr>
-            <a:endParaRPr lang="en-US" dirty="0" smtClean="0"/>
-          </a:p>
-          <a:p>
-            <a:endParaRPr lang="en-US" dirty="0"/>
+      </p:pic>
+      <p:sp>
+        <p:nvSpPr>
+          <p:cNvPr id="7" name="Content Placeholder 6"/>
+          <p:cNvSpPr>
+            <a:spLocks noGrp="1"/>
+          </p:cNvSpPr>
+          <p:nvPr>
+            <p:ph idx="1"/>
+          </p:nvPr>
+        </p:nvSpPr>
+        <p:spPr/>
+        <p:txBody>
+          <a:bodyPr/>
+          <a:lstStyle/>
+          <a:p>
+            <a:endParaRPr lang="en-US"/>
           </a:p>
         </p:txBody>
       </p:sp>

</xml_diff>

<commit_message>
changed code for on error
</commit_message>
<xml_diff>
--- a/Logger.pptx
+++ b/Logger.pptx
@@ -122,6 +122,11 @@
       </a:defRPr>
     </a:lvl9pPr>
   </p:defaultTextStyle>
+  <p:extLst>
+    <p:ext uri="{EFAFB233-063F-42B5-8137-9DF3F51BA10A}">
+      <p15:sldGuideLst xmlns:p15="http://schemas.microsoft.com/office/powerpoint/2012/main"/>
+    </p:ext>
+  </p:extLst>
 </p:presentation>
 </file>
 
@@ -207,7 +212,7 @@
           <a:p>
             <a:fld id="{B1EE312A-1FB5-48B6-B547-17021D7C4B84}" type="datetimeFigureOut">
               <a:rPr lang="en-US" smtClean="0"/>
-              <a:t>3/20/2014</a:t>
+              <a:t>3/21/2014</a:t>
             </a:fld>
             <a:endParaRPr lang="en-US"/>
           </a:p>
@@ -690,7 +695,7 @@
           <a:p>
             <a:fld id="{1B06E501-5D52-415D-AAFC-40279CA9FC0A}" type="datetimeFigureOut">
               <a:rPr lang="en-US" smtClean="0"/>
-              <a:t>3/20/2014</a:t>
+              <a:t>3/21/2014</a:t>
             </a:fld>
             <a:endParaRPr lang="en-US"/>
           </a:p>
@@ -860,7 +865,7 @@
           <a:p>
             <a:fld id="{1B06E501-5D52-415D-AAFC-40279CA9FC0A}" type="datetimeFigureOut">
               <a:rPr lang="en-US" smtClean="0"/>
-              <a:t>3/20/2014</a:t>
+              <a:t>3/21/2014</a:t>
             </a:fld>
             <a:endParaRPr lang="en-US"/>
           </a:p>
@@ -1040,7 +1045,7 @@
           <a:p>
             <a:fld id="{1B06E501-5D52-415D-AAFC-40279CA9FC0A}" type="datetimeFigureOut">
               <a:rPr lang="en-US" smtClean="0"/>
-              <a:t>3/20/2014</a:t>
+              <a:t>3/21/2014</a:t>
             </a:fld>
             <a:endParaRPr lang="en-US"/>
           </a:p>
@@ -1210,7 +1215,7 @@
           <a:p>
             <a:fld id="{1B06E501-5D52-415D-AAFC-40279CA9FC0A}" type="datetimeFigureOut">
               <a:rPr lang="en-US" smtClean="0"/>
-              <a:t>3/20/2014</a:t>
+              <a:t>3/21/2014</a:t>
             </a:fld>
             <a:endParaRPr lang="en-US"/>
           </a:p>
@@ -1456,7 +1461,7 @@
           <a:p>
             <a:fld id="{1B06E501-5D52-415D-AAFC-40279CA9FC0A}" type="datetimeFigureOut">
               <a:rPr lang="en-US" smtClean="0"/>
-              <a:t>3/20/2014</a:t>
+              <a:t>3/21/2014</a:t>
             </a:fld>
             <a:endParaRPr lang="en-US"/>
           </a:p>
@@ -1688,7 +1693,7 @@
           <a:p>
             <a:fld id="{1B06E501-5D52-415D-AAFC-40279CA9FC0A}" type="datetimeFigureOut">
               <a:rPr lang="en-US" smtClean="0"/>
-              <a:t>3/20/2014</a:t>
+              <a:t>3/21/2014</a:t>
             </a:fld>
             <a:endParaRPr lang="en-US"/>
           </a:p>
@@ -2055,7 +2060,7 @@
           <a:p>
             <a:fld id="{1B06E501-5D52-415D-AAFC-40279CA9FC0A}" type="datetimeFigureOut">
               <a:rPr lang="en-US" smtClean="0"/>
-              <a:t>3/20/2014</a:t>
+              <a:t>3/21/2014</a:t>
             </a:fld>
             <a:endParaRPr lang="en-US"/>
           </a:p>
@@ -2173,7 +2178,7 @@
           <a:p>
             <a:fld id="{1B06E501-5D52-415D-AAFC-40279CA9FC0A}" type="datetimeFigureOut">
               <a:rPr lang="en-US" smtClean="0"/>
-              <a:t>3/20/2014</a:t>
+              <a:t>3/21/2014</a:t>
             </a:fld>
             <a:endParaRPr lang="en-US"/>
           </a:p>
@@ -2268,7 +2273,7 @@
           <a:p>
             <a:fld id="{1B06E501-5D52-415D-AAFC-40279CA9FC0A}" type="datetimeFigureOut">
               <a:rPr lang="en-US" smtClean="0"/>
-              <a:t>3/20/2014</a:t>
+              <a:t>3/21/2014</a:t>
             </a:fld>
             <a:endParaRPr lang="en-US"/>
           </a:p>
@@ -2545,7 +2550,7 @@
           <a:p>
             <a:fld id="{1B06E501-5D52-415D-AAFC-40279CA9FC0A}" type="datetimeFigureOut">
               <a:rPr lang="en-US" smtClean="0"/>
-              <a:t>3/20/2014</a:t>
+              <a:t>3/21/2014</a:t>
             </a:fld>
             <a:endParaRPr lang="en-US"/>
           </a:p>
@@ -2798,7 +2803,7 @@
           <a:p>
             <a:fld id="{1B06E501-5D52-415D-AAFC-40279CA9FC0A}" type="datetimeFigureOut">
               <a:rPr lang="en-US" smtClean="0"/>
-              <a:t>3/20/2014</a:t>
+              <a:t>3/21/2014</a:t>
             </a:fld>
             <a:endParaRPr lang="en-US"/>
           </a:p>
@@ -3011,7 +3016,7 @@
           <a:p>
             <a:fld id="{1B06E501-5D52-415D-AAFC-40279CA9FC0A}" type="datetimeFigureOut">
               <a:rPr lang="en-US" smtClean="0"/>
-              <a:t>3/20/2014</a:t>
+              <a:t>3/21/2014</a:t>
             </a:fld>
             <a:endParaRPr lang="en-US"/>
           </a:p>
@@ -3986,7 +3991,9 @@
         </p:nvSpPr>
         <p:spPr/>
         <p:txBody>
-          <a:bodyPr/>
+          <a:bodyPr>
+            <a:normAutofit fontScale="32500" lnSpcReduction="20000"/>
+          </a:bodyPr>
           <a:lstStyle/>
           <a:p>
             <a:r>
@@ -3999,12 +4006,126 @@
               <a:buNone/>
             </a:pPr>
             <a:r>
-              <a:rPr lang="en-US" dirty="0" err="1" smtClean="0"/>
+              <a:rPr lang="en-US" dirty="0" err="1"/>
+              <a:t>onError</a:t>
+            </a:r>
+            <a:r>
+              <a:rPr lang="en-US" dirty="0"/>
+              <a:t>: function(</a:t>
+            </a:r>
+            <a:r>
+              <a:rPr lang="en-US" dirty="0" err="1"/>
+              <a:t>exportLog</a:t>
+            </a:r>
+            <a:r>
+              <a:rPr lang="en-US" dirty="0"/>
+              <a:t>, </a:t>
+            </a:r>
+            <a:r>
+              <a:rPr lang="en-US" dirty="0" err="1"/>
+              <a:t>suppressErrorAlerts</a:t>
+            </a:r>
+            <a:r>
+              <a:rPr lang="en-US" dirty="0"/>
+              <a:t>, </a:t>
+            </a:r>
+            <a:r>
+              <a:rPr lang="en-US" dirty="0" err="1"/>
+              <a:t>errorCallback</a:t>
+            </a:r>
+            <a:r>
+              <a:rPr lang="en-US" dirty="0"/>
+              <a:t>) {</a:t>
+            </a:r>
+          </a:p>
+          <a:p>
+            <a:pPr marL="0" indent="0">
+              <a:buNone/>
+            </a:pPr>
+            <a:r>
+              <a:rPr lang="en-US" dirty="0"/>
+              <a:t>            </a:t>
+            </a:r>
+            <a:r>
+              <a:rPr lang="en-US" dirty="0" err="1"/>
+              <a:t>var</a:t>
+            </a:r>
+            <a:r>
+              <a:rPr lang="en-US" dirty="0"/>
+              <a:t> me = this,</a:t>
+            </a:r>
+          </a:p>
+          <a:p>
+            <a:pPr marL="0" indent="0">
+              <a:buNone/>
+            </a:pPr>
+            <a:r>
+              <a:rPr lang="en-US" dirty="0"/>
+              <a:t>                </a:t>
+            </a:r>
+            <a:r>
+              <a:rPr lang="en-US" dirty="0" err="1"/>
+              <a:t>errorMessage</a:t>
+            </a:r>
+            <a:r>
+              <a:rPr lang="en-US" dirty="0"/>
+              <a:t> = '';</a:t>
+            </a:r>
+          </a:p>
+          <a:p>
+            <a:pPr marL="0" indent="0">
+              <a:buNone/>
+            </a:pPr>
+            <a:endParaRPr lang="en-US" dirty="0"/>
+          </a:p>
+          <a:p>
+            <a:pPr marL="0" indent="0">
+              <a:buNone/>
+            </a:pPr>
+            <a:r>
+              <a:rPr lang="en-US" dirty="0"/>
+              <a:t>            if (</a:t>
+            </a:r>
+            <a:r>
+              <a:rPr lang="en-US" dirty="0" err="1"/>
+              <a:t>typeof</a:t>
+            </a:r>
+            <a:r>
+              <a:rPr lang="en-US" dirty="0"/>
+              <a:t> </a:t>
+            </a:r>
+            <a:r>
+              <a:rPr lang="en-US" dirty="0" err="1"/>
+              <a:t>errorCallback</a:t>
+            </a:r>
+            <a:r>
+              <a:rPr lang="en-US" dirty="0"/>
+              <a:t> !== 'undefined') {</a:t>
+            </a:r>
+          </a:p>
+          <a:p>
+            <a:pPr marL="0" indent="0">
+              <a:buNone/>
+            </a:pPr>
+            <a:r>
+              <a:rPr lang="en-US" dirty="0"/>
+              <a:t>                </a:t>
+            </a:r>
+            <a:r>
+              <a:rPr lang="en-US" dirty="0" err="1"/>
               <a:t>window.onerror</a:t>
             </a:r>
             <a:r>
-              <a:rPr lang="en-US" dirty="0" smtClean="0"/>
-              <a:t> = function () {</a:t>
+              <a:rPr lang="en-US" dirty="0"/>
+              <a:t> = </a:t>
+            </a:r>
+            <a:r>
+              <a:rPr lang="en-US" dirty="0" err="1"/>
+              <a:t>errorCallback</a:t>
+            </a:r>
+            <a:r>
+              <a:rPr lang="en-US" dirty="0"/>
+              <a:t>;</a:t>
             </a:r>
           </a:p>
           <a:p>
@@ -4013,14 +4134,162 @@
             </a:pPr>
             <a:r>
               <a:rPr lang="en-US" dirty="0"/>
-              <a:t>	</a:t>
-            </a:r>
-            <a:r>
-              <a:rPr lang="en-US" dirty="0" err="1" smtClean="0"/>
+              <a:t>            } else if (</a:t>
+            </a:r>
+            <a:r>
+              <a:rPr lang="en-US" dirty="0" err="1"/>
+              <a:t>exportLog</a:t>
+            </a:r>
+            <a:r>
+              <a:rPr lang="en-US" dirty="0"/>
+              <a:t> &amp;&amp; </a:t>
+            </a:r>
+            <a:r>
+              <a:rPr lang="en-US" dirty="0" err="1"/>
+              <a:t>typeof</a:t>
+            </a:r>
+            <a:r>
+              <a:rPr lang="en-US" dirty="0"/>
+              <a:t> </a:t>
+            </a:r>
+            <a:r>
+              <a:rPr lang="en-US" dirty="0" err="1"/>
+              <a:t>errorCallback</a:t>
+            </a:r>
+            <a:r>
+              <a:rPr lang="en-US" dirty="0"/>
+              <a:t> === 'undefined') {</a:t>
+            </a:r>
+          </a:p>
+          <a:p>
+            <a:pPr marL="0" indent="0">
+              <a:buNone/>
+            </a:pPr>
+            <a:r>
+              <a:rPr lang="en-US" dirty="0"/>
+              <a:t>                </a:t>
+            </a:r>
+            <a:r>
+              <a:rPr lang="en-US" dirty="0" err="1"/>
+              <a:t>window.onerror</a:t>
+            </a:r>
+            <a:r>
+              <a:rPr lang="en-US" dirty="0"/>
+              <a:t> = function (</a:t>
+            </a:r>
+            <a:r>
+              <a:rPr lang="en-US" dirty="0" err="1"/>
+              <a:t>errorMsg</a:t>
+            </a:r>
+            <a:r>
+              <a:rPr lang="en-US" dirty="0"/>
+              <a:t>, </a:t>
+            </a:r>
+            <a:r>
+              <a:rPr lang="en-US" dirty="0" err="1"/>
+              <a:t>url</a:t>
+            </a:r>
+            <a:r>
+              <a:rPr lang="en-US" dirty="0"/>
+              <a:t>, </a:t>
+            </a:r>
+            <a:r>
+              <a:rPr lang="en-US" dirty="0" err="1"/>
+              <a:t>lineNumber</a:t>
+            </a:r>
+            <a:r>
+              <a:rPr lang="en-US" dirty="0"/>
+              <a:t>) {</a:t>
+            </a:r>
+          </a:p>
+          <a:p>
+            <a:pPr marL="0" indent="0">
+              <a:buNone/>
+            </a:pPr>
+            <a:r>
+              <a:rPr lang="en-US" dirty="0"/>
+              <a:t>                    </a:t>
+            </a:r>
+            <a:r>
+              <a:rPr lang="en-US" dirty="0" err="1"/>
+              <a:t>errorMessage</a:t>
+            </a:r>
+            <a:r>
+              <a:rPr lang="en-US" dirty="0"/>
+              <a:t> = </a:t>
+            </a:r>
+            <a:r>
+              <a:rPr lang="en-US" dirty="0" err="1"/>
+              <a:t>errorMsg</a:t>
+            </a:r>
+            <a:r>
+              <a:rPr lang="en-US" dirty="0"/>
+              <a:t> + ' at line: ' + </a:t>
+            </a:r>
+            <a:r>
+              <a:rPr lang="en-US" dirty="0" err="1"/>
+              <a:t>lineNumber</a:t>
+            </a:r>
+            <a:r>
+              <a:rPr lang="en-US" dirty="0"/>
+              <a:t> + ' in ' + </a:t>
+            </a:r>
+            <a:r>
+              <a:rPr lang="en-US" dirty="0" err="1"/>
+              <a:t>url</a:t>
+            </a:r>
+            <a:r>
+              <a:rPr lang="en-US" dirty="0"/>
+              <a:t>;</a:t>
+            </a:r>
+          </a:p>
+          <a:p>
+            <a:pPr marL="0" indent="0">
+              <a:buNone/>
+            </a:pPr>
+            <a:r>
+              <a:rPr lang="en-US" dirty="0"/>
+              <a:t>                    me.log(</a:t>
+            </a:r>
+            <a:r>
+              <a:rPr lang="en-US" dirty="0" err="1"/>
+              <a:t>me.level.Error</a:t>
+            </a:r>
+            <a:r>
+              <a:rPr lang="en-US" dirty="0"/>
+              <a:t>, </a:t>
+            </a:r>
+            <a:r>
+              <a:rPr lang="en-US" dirty="0" err="1"/>
+              <a:t>errorMessage</a:t>
+            </a:r>
+            <a:r>
+              <a:rPr lang="en-US" dirty="0"/>
+              <a:t>, </a:t>
+            </a:r>
+            <a:r>
+              <a:rPr lang="en-US" dirty="0" err="1"/>
+              <a:t>me.location.All</a:t>
+            </a:r>
+            <a:r>
+              <a:rPr lang="en-US" dirty="0"/>
+              <a:t>);</a:t>
+            </a:r>
+          </a:p>
+          <a:p>
+            <a:pPr marL="0" indent="0">
+              <a:buNone/>
+            </a:pPr>
+            <a:r>
+              <a:rPr lang="en-US" dirty="0"/>
+              <a:t>                    </a:t>
+            </a:r>
+            <a:r>
+              <a:rPr lang="en-US" dirty="0" err="1"/>
               <a:t>me.exportLog</a:t>
             </a:r>
             <a:r>
-              <a:rPr lang="en-US" dirty="0" smtClean="0"/>
+              <a:rPr lang="en-US" dirty="0"/>
               <a:t>();</a:t>
             </a:r>
           </a:p>
@@ -4029,8 +4298,16 @@
               <a:buNone/>
             </a:pPr>
             <a:r>
-              <a:rPr lang="en-US" dirty="0" smtClean="0"/>
-              <a:t>	return true; //When the function returns true, this prevents the 			//firing of the default event handler</a:t>
+              <a:rPr lang="en-US" dirty="0"/>
+              <a:t>					return </a:t>
+            </a:r>
+            <a:r>
+              <a:rPr lang="en-US" dirty="0" err="1"/>
+              <a:t>suppressErrorAlerts</a:t>
+            </a:r>
+            <a:r>
+              <a:rPr lang="en-US" dirty="0"/>
+              <a:t>;</a:t>
             </a:r>
           </a:p>
           <a:p>
@@ -4038,10 +4315,53 @@
               <a:buNone/>
             </a:pPr>
             <a:r>
-              <a:rPr lang="en-US" dirty="0" smtClean="0"/>
-              <a:t>}</a:t>
-            </a:r>
-            <a:endParaRPr lang="en-US" dirty="0"/>
+              <a:rPr lang="en-US" dirty="0"/>
+              <a:t>                }</a:t>
+            </a:r>
+          </a:p>
+          <a:p>
+            <a:pPr marL="0" indent="0">
+              <a:buNone/>
+            </a:pPr>
+            <a:r>
+              <a:rPr lang="en-US" dirty="0"/>
+              <a:t>            } else {</a:t>
+            </a:r>
+          </a:p>
+          <a:p>
+            <a:pPr marL="0" indent="0">
+              <a:buNone/>
+            </a:pPr>
+            <a:r>
+              <a:rPr lang="en-US" dirty="0"/>
+              <a:t>                </a:t>
+            </a:r>
+            <a:r>
+              <a:rPr lang="en-US" dirty="0" err="1"/>
+              <a:t>me.resetWindowErrorHandler</a:t>
+            </a:r>
+            <a:r>
+              <a:rPr lang="en-US" dirty="0"/>
+              <a:t>();</a:t>
+            </a:r>
+          </a:p>
+          <a:p>
+            <a:pPr marL="0" indent="0">
+              <a:buNone/>
+            </a:pPr>
+            <a:r>
+              <a:rPr lang="en-US" dirty="0"/>
+              <a:t>            }</a:t>
+            </a:r>
+          </a:p>
+          <a:p>
+            <a:pPr marL="0" indent="0">
+              <a:buNone/>
+            </a:pPr>
+            <a:r>
+              <a:rPr lang="en-US" dirty="0"/>
+              <a:t>        }</a:t>
+            </a:r>
           </a:p>
         </p:txBody>
       </p:sp>

</xml_diff>